<commit_message>
added images to ppt
</commit_message>
<xml_diff>
--- a/project/Presentation.pptx
+++ b/project/Presentation.pptx
@@ -2961,6 +2961,133 @@
           </a:p>
         </p:txBody>
       </p:sp>
+      <p:pic>
+        <p:nvPicPr>
+          <p:cNvPr id="7" name="Imagem 6">
+            <a:hlinkClick r:id="rId2"/>
+            <a:extLst>
+              <a:ext uri="{FF2B5EF4-FFF2-40B4-BE49-F238E27FC236}">
+                <a16:creationId xmlns:a16="http://schemas.microsoft.com/office/drawing/2014/main" id="{61EFA9C3-5002-45A4-B40C-ABFD732E2EB4}"/>
+              </a:ext>
+              <a:ext uri="{C183D7F6-B498-43B3-948B-1728B52AA6E4}">
+                <adec:decorative xmlns:adec="http://schemas.microsoft.com/office/drawing/2017/decorative" val="0"/>
+              </a:ext>
+            </a:extLst>
+          </p:cNvPr>
+          <p:cNvPicPr>
+            <a:picLocks noChangeAspect="1"/>
+          </p:cNvPicPr>
+          <p:nvPr/>
+        </p:nvPicPr>
+        <p:blipFill rotWithShape="1">
+          <a:blip r:embed="rId3">
+            <a:extLst>
+              <a:ext uri="{28A0092B-C50C-407E-A947-70E740481C1C}">
+                <a14:useLocalDpi xmlns:a14="http://schemas.microsoft.com/office/drawing/2010/main" val="0"/>
+              </a:ext>
+            </a:extLst>
+          </a:blip>
+          <a:srcRect t="15127" b="6946"/>
+          <a:stretch/>
+        </p:blipFill>
+        <p:spPr>
+          <a:xfrm>
+            <a:off x="3419872" y="4270410"/>
+            <a:ext cx="5472608" cy="2254934"/>
+          </a:xfrm>
+          <a:prstGeom prst="rect">
+            <a:avLst/>
+          </a:prstGeom>
+        </p:spPr>
+      </p:pic>
+      <p:sp>
+        <p:nvSpPr>
+          <p:cNvPr id="8" name="CaixaDeTexto 7">
+            <a:extLst>
+              <a:ext uri="{FF2B5EF4-FFF2-40B4-BE49-F238E27FC236}">
+                <a16:creationId xmlns:a16="http://schemas.microsoft.com/office/drawing/2014/main" id="{6A274F79-913B-4BC4-9FE2-2B852C668354}"/>
+              </a:ext>
+            </a:extLst>
+          </p:cNvPr>
+          <p:cNvSpPr txBox="1"/>
+          <p:nvPr/>
+        </p:nvSpPr>
+        <p:spPr>
+          <a:xfrm>
+            <a:off x="3347864" y="6538554"/>
+            <a:ext cx="5472608" cy="261610"/>
+          </a:xfrm>
+          <a:prstGeom prst="rect">
+            <a:avLst/>
+          </a:prstGeom>
+          <a:noFill/>
+        </p:spPr>
+        <p:txBody>
+          <a:bodyPr wrap="square" rtlCol="0">
+            <a:spAutoFit/>
+          </a:bodyPr>
+          <a:lstStyle/>
+          <a:p>
+            <a:r>
+              <a:rPr lang="pt-PT" sz="1050" dirty="0" err="1"/>
+              <a:t>World</a:t>
+            </a:r>
+            <a:r>
+              <a:rPr lang="pt-PT" sz="1050" dirty="0"/>
+              <a:t> </a:t>
+            </a:r>
+            <a:r>
+              <a:rPr lang="pt-PT" sz="1050" dirty="0" err="1"/>
+              <a:t>Energy</a:t>
+            </a:r>
+            <a:r>
+              <a:rPr lang="pt-PT" sz="1050" dirty="0"/>
+              <a:t> </a:t>
+            </a:r>
+            <a:r>
+              <a:rPr lang="pt-PT" sz="1050" dirty="0" err="1"/>
+              <a:t>Production</a:t>
+            </a:r>
+            <a:r>
+              <a:rPr lang="pt-PT" sz="1050" dirty="0"/>
+              <a:t> </a:t>
+            </a:r>
+            <a:r>
+              <a:rPr lang="pt-PT" sz="1050" dirty="0" err="1"/>
+              <a:t>by</a:t>
+            </a:r>
+            <a:r>
+              <a:rPr lang="pt-PT" sz="1050" dirty="0"/>
+              <a:t> </a:t>
+            </a:r>
+            <a:r>
+              <a:rPr lang="pt-PT" sz="1050" dirty="0" err="1"/>
+              <a:t>Source</a:t>
+            </a:r>
+            <a:r>
+              <a:rPr lang="pt-PT" sz="1050" dirty="0"/>
+              <a:t>, </a:t>
+            </a:r>
+            <a:r>
+              <a:rPr lang="pt-PT" sz="1050" i="1" dirty="0" err="1"/>
+              <a:t>Our</a:t>
+            </a:r>
+            <a:r>
+              <a:rPr lang="pt-PT" sz="1050" i="1" dirty="0"/>
+              <a:t> </a:t>
+            </a:r>
+            <a:r>
+              <a:rPr lang="pt-PT" sz="1050" i="1" dirty="0" err="1"/>
+              <a:t>World</a:t>
+            </a:r>
+            <a:r>
+              <a:rPr lang="pt-PT" sz="1050" i="1" dirty="0"/>
+              <a:t> in Data</a:t>
+            </a:r>
+            <a:endParaRPr lang="pt-PT" sz="1050" dirty="0"/>
+          </a:p>
+        </p:txBody>
+      </p:sp>
     </p:spTree>
     <p:extLst>
       <p:ext uri="{BB962C8B-B14F-4D97-AF65-F5344CB8AC3E}">
@@ -3396,6 +3523,7 @@
       <p:pic>
         <p:nvPicPr>
           <p:cNvPr id="6" name="Imagem 5">
+            <a:hlinkClick r:id="rId2"/>
             <a:extLst>
               <a:ext uri="{FF2B5EF4-FFF2-40B4-BE49-F238E27FC236}">
                 <a16:creationId xmlns:a16="http://schemas.microsoft.com/office/drawing/2014/main" id="{E00F6797-CE9E-4343-A841-DE2CF8046BFD}"/>
@@ -3408,20 +3536,88 @@
           <p:nvPr/>
         </p:nvPicPr>
         <p:blipFill rotWithShape="1">
-          <a:blip r:embed="rId2"/>
+          <a:blip r:embed="rId3"/>
           <a:srcRect l="3910" t="6807" r="1604" b="5006"/>
           <a:stretch/>
         </p:blipFill>
         <p:spPr>
           <a:xfrm>
-            <a:off x="6228184" y="3429000"/>
-            <a:ext cx="2700227" cy="3227103"/>
+            <a:off x="6218790" y="3363539"/>
+            <a:ext cx="2585339" cy="3089798"/>
           </a:xfrm>
           <a:prstGeom prst="rect">
             <a:avLst/>
           </a:prstGeom>
         </p:spPr>
       </p:pic>
+      <p:sp>
+        <p:nvSpPr>
+          <p:cNvPr id="4" name="CaixaDeTexto 3">
+            <a:extLst>
+              <a:ext uri="{FF2B5EF4-FFF2-40B4-BE49-F238E27FC236}">
+                <a16:creationId xmlns:a16="http://schemas.microsoft.com/office/drawing/2014/main" id="{51D59AAA-3D76-48E8-9467-E5F7980A2BDC}"/>
+              </a:ext>
+            </a:extLst>
+          </p:cNvPr>
+          <p:cNvSpPr txBox="1"/>
+          <p:nvPr/>
+        </p:nvSpPr>
+        <p:spPr>
+          <a:xfrm>
+            <a:off x="6121456" y="6525344"/>
+            <a:ext cx="2771024" cy="261610"/>
+          </a:xfrm>
+          <a:prstGeom prst="rect">
+            <a:avLst/>
+          </a:prstGeom>
+          <a:noFill/>
+        </p:spPr>
+        <p:txBody>
+          <a:bodyPr wrap="square" rtlCol="0">
+            <a:spAutoFit/>
+          </a:bodyPr>
+          <a:lstStyle/>
+          <a:p>
+            <a:r>
+              <a:rPr lang="pt-PT" sz="1100" dirty="0" err="1"/>
+              <a:t>Lamps</a:t>
+            </a:r>
+            <a:r>
+              <a:rPr lang="pt-PT" sz="1100" dirty="0"/>
+              <a:t> </a:t>
+            </a:r>
+            <a:r>
+              <a:rPr lang="pt-PT" sz="1100" dirty="0" err="1"/>
+              <a:t>Unwanted</a:t>
+            </a:r>
+            <a:r>
+              <a:rPr lang="pt-PT" sz="1100" dirty="0"/>
+              <a:t> </a:t>
+            </a:r>
+            <a:r>
+              <a:rPr lang="pt-PT" sz="1100" dirty="0" err="1"/>
+              <a:t>Glare</a:t>
+            </a:r>
+            <a:r>
+              <a:rPr lang="pt-PT" sz="1100" dirty="0"/>
+              <a:t>, </a:t>
+            </a:r>
+            <a:r>
+              <a:rPr lang="pt-PT" sz="1100" i="1" dirty="0" err="1"/>
+              <a:t>National</a:t>
+            </a:r>
+            <a:r>
+              <a:rPr lang="pt-PT" sz="1100" i="1" dirty="0"/>
+              <a:t> </a:t>
+            </a:r>
+            <a:r>
+              <a:rPr lang="pt-PT" sz="1100" i="1" dirty="0" err="1"/>
+              <a:t>Geographic</a:t>
+            </a:r>
+            <a:endParaRPr lang="pt-PT" sz="1100" dirty="0"/>
+          </a:p>
+        </p:txBody>
+      </p:sp>
     </p:spTree>
     <p:extLst>
       <p:ext uri="{BB962C8B-B14F-4D97-AF65-F5344CB8AC3E}">
@@ -4891,14 +5087,6 @@
 </file>
 
 <file path=customXml/item1.xml><?xml version="1.0" encoding="utf-8"?>
-<p:properties xmlns:p="http://schemas.microsoft.com/office/2006/metadata/properties" xmlns:xsi="http://www.w3.org/2001/XMLSchema-instance" xmlns:pc="http://schemas.microsoft.com/office/infopath/2007/PartnerControls"/>
-</file>
-
-<file path=customXml/item2.xml><?xml version="1.0" encoding="utf-8"?>
-<ct:contentTypeSchema xmlns:ct="http://schemas.microsoft.com/office/2006/metadata/contentType" xmlns:ma="http://schemas.microsoft.com/office/2006/metadata/properties/metaAttributes" ct:_="" ma:_="" ma:contentTypeName="TemplateFile" ma:contentTypeID="0x0101005EB5FCBB1E5ECD4D83FA6E62BA4F98FF04003B76559807ED7042AFCC9CD6E0E16B7A" ma:contentTypeVersion="23" ma:contentTypeDescription="Create a new document." ma:contentTypeScope="" ma:versionID="4e7ae912b4fbccaa31f4eb83f826eee0"/>
-</file>
-
-<file path=customXml/item3.xml><?xml version="1.0" encoding="utf-8"?>
 <?mso-contentType ?>
 <FormTemplates xmlns="http://schemas.microsoft.com/sharepoint/v3/contenttype/forms">
   <Display>DocumentLibraryForm</Display>
@@ -4907,11 +5095,18 @@
 </FormTemplates>
 </file>
 
+<file path=customXml/item2.xml><?xml version="1.0" encoding="utf-8"?>
+<ct:contentTypeSchema xmlns:ct="http://schemas.microsoft.com/office/2006/metadata/contentType" xmlns:ma="http://schemas.microsoft.com/office/2006/metadata/properties/metaAttributes" ct:_="" ma:_="" ma:contentTypeName="TemplateFile" ma:contentTypeID="0x0101005EB5FCBB1E5ECD4D83FA6E62BA4F98FF04003B76559807ED7042AFCC9CD6E0E16B7A" ma:contentTypeVersion="23" ma:contentTypeDescription="Create a new document." ma:contentTypeScope="" ma:versionID="4e7ae912b4fbccaa31f4eb83f826eee0"/>
+</file>
+
+<file path=customXml/item3.xml><?xml version="1.0" encoding="utf-8"?>
+<p:properties xmlns:p="http://schemas.microsoft.com/office/2006/metadata/properties" xmlns:xsi="http://www.w3.org/2001/XMLSchema-instance" xmlns:pc="http://schemas.microsoft.com/office/infopath/2007/PartnerControls"/>
+</file>
+
 <file path=customXml/itemProps1.xml><?xml version="1.0" encoding="utf-8"?>
-<ds:datastoreItem xmlns:ds="http://schemas.openxmlformats.org/officeDocument/2006/customXml" ds:itemID="{01D2A88F-2AED-40BE-90C1-A47312572039}">
+<ds:datastoreItem xmlns:ds="http://schemas.openxmlformats.org/officeDocument/2006/customXml" ds:itemID="{639430A2-2E43-417E-8E0C-4D89782865E9}">
   <ds:schemaRefs>
-    <ds:schemaRef ds:uri="http://schemas.microsoft.com/office/2006/metadata/properties"/>
-    <ds:schemaRef ds:uri="http://schemas.microsoft.com/office/infopath/2007/PartnerControls"/>
+    <ds:schemaRef ds:uri="http://schemas.microsoft.com/sharepoint/v3/contenttype/forms"/>
   </ds:schemaRefs>
 </ds:datastoreItem>
 </file>
@@ -4926,9 +5121,10 @@
 </file>
 
 <file path=customXml/itemProps3.xml><?xml version="1.0" encoding="utf-8"?>
-<ds:datastoreItem xmlns:ds="http://schemas.openxmlformats.org/officeDocument/2006/customXml" ds:itemID="{639430A2-2E43-417E-8E0C-4D89782865E9}">
+<ds:datastoreItem xmlns:ds="http://schemas.openxmlformats.org/officeDocument/2006/customXml" ds:itemID="{01D2A88F-2AED-40BE-90C1-A47312572039}">
   <ds:schemaRefs>
-    <ds:schemaRef ds:uri="http://schemas.microsoft.com/sharepoint/v3/contenttype/forms"/>
+    <ds:schemaRef ds:uri="http://schemas.microsoft.com/office/2006/metadata/properties"/>
+    <ds:schemaRef ds:uri="http://schemas.microsoft.com/office/infopath/2007/PartnerControls"/>
   </ds:schemaRefs>
 </ds:datastoreItem>
 </file>
</xml_diff>